<commit_message>
pqtree for multi chars & merged chars - some tests fail
</commit_message>
<xml_diff>
--- a/pqtrees/pqtree.pptx
+++ b/pqtrees/pqtree.pptx
@@ -113,6 +113,11 @@
       </a:defRPr>
     </a:lvl9pPr>
   </p:defaultTextStyle>
+  <p:extLst>
+    <p:ext uri="{EFAFB233-063F-42B5-8137-9DF3F51BA10A}">
+      <p15:sldGuideLst xmlns:p15="http://schemas.microsoft.com/office/powerpoint/2012/main"/>
+    </p:ext>
+  </p:extLst>
 </p:presentation>
 </file>
 
@@ -263,7 +268,7 @@
           <a:p>
             <a:fld id="{619DA116-9E36-A740-B8E8-0332E2C9182A}" type="datetimeFigureOut">
               <a:rPr lang="en-US" smtClean="0"/>
-              <a:t>4/4/20</a:t>
+              <a:t>4/14/20</a:t>
             </a:fld>
             <a:endParaRPr lang="en-US"/>
           </a:p>
@@ -461,7 +466,7 @@
           <a:p>
             <a:fld id="{619DA116-9E36-A740-B8E8-0332E2C9182A}" type="datetimeFigureOut">
               <a:rPr lang="en-US" smtClean="0"/>
-              <a:t>4/4/20</a:t>
+              <a:t>4/14/20</a:t>
             </a:fld>
             <a:endParaRPr lang="en-US"/>
           </a:p>
@@ -669,7 +674,7 @@
           <a:p>
             <a:fld id="{619DA116-9E36-A740-B8E8-0332E2C9182A}" type="datetimeFigureOut">
               <a:rPr lang="en-US" smtClean="0"/>
-              <a:t>4/4/20</a:t>
+              <a:t>4/14/20</a:t>
             </a:fld>
             <a:endParaRPr lang="en-US"/>
           </a:p>
@@ -867,7 +872,7 @@
           <a:p>
             <a:fld id="{619DA116-9E36-A740-B8E8-0332E2C9182A}" type="datetimeFigureOut">
               <a:rPr lang="en-US" smtClean="0"/>
-              <a:t>4/4/20</a:t>
+              <a:t>4/14/20</a:t>
             </a:fld>
             <a:endParaRPr lang="en-US"/>
           </a:p>
@@ -1142,7 +1147,7 @@
           <a:p>
             <a:fld id="{619DA116-9E36-A740-B8E8-0332E2C9182A}" type="datetimeFigureOut">
               <a:rPr lang="en-US" smtClean="0"/>
-              <a:t>4/4/20</a:t>
+              <a:t>4/14/20</a:t>
             </a:fld>
             <a:endParaRPr lang="en-US"/>
           </a:p>
@@ -1407,7 +1412,7 @@
           <a:p>
             <a:fld id="{619DA116-9E36-A740-B8E8-0332E2C9182A}" type="datetimeFigureOut">
               <a:rPr lang="en-US" smtClean="0"/>
-              <a:t>4/4/20</a:t>
+              <a:t>4/14/20</a:t>
             </a:fld>
             <a:endParaRPr lang="en-US"/>
           </a:p>
@@ -1819,7 +1824,7 @@
           <a:p>
             <a:fld id="{619DA116-9E36-A740-B8E8-0332E2C9182A}" type="datetimeFigureOut">
               <a:rPr lang="en-US" smtClean="0"/>
-              <a:t>4/4/20</a:t>
+              <a:t>4/14/20</a:t>
             </a:fld>
             <a:endParaRPr lang="en-US"/>
           </a:p>
@@ -1960,7 +1965,7 @@
           <a:p>
             <a:fld id="{619DA116-9E36-A740-B8E8-0332E2C9182A}" type="datetimeFigureOut">
               <a:rPr lang="en-US" smtClean="0"/>
-              <a:t>4/4/20</a:t>
+              <a:t>4/14/20</a:t>
             </a:fld>
             <a:endParaRPr lang="en-US"/>
           </a:p>
@@ -2073,7 +2078,7 @@
           <a:p>
             <a:fld id="{619DA116-9E36-A740-B8E8-0332E2C9182A}" type="datetimeFigureOut">
               <a:rPr lang="en-US" smtClean="0"/>
-              <a:t>4/4/20</a:t>
+              <a:t>4/14/20</a:t>
             </a:fld>
             <a:endParaRPr lang="en-US"/>
           </a:p>
@@ -2384,7 +2389,7 @@
           <a:p>
             <a:fld id="{619DA116-9E36-A740-B8E8-0332E2C9182A}" type="datetimeFigureOut">
               <a:rPr lang="en-US" smtClean="0"/>
-              <a:t>4/4/20</a:t>
+              <a:t>4/14/20</a:t>
             </a:fld>
             <a:endParaRPr lang="en-US"/>
           </a:p>
@@ -2672,7 +2677,7 @@
           <a:p>
             <a:fld id="{619DA116-9E36-A740-B8E8-0332E2C9182A}" type="datetimeFigureOut">
               <a:rPr lang="en-US" smtClean="0"/>
-              <a:t>4/4/20</a:t>
+              <a:t>4/14/20</a:t>
             </a:fld>
             <a:endParaRPr lang="en-US"/>
           </a:p>
@@ -2913,7 +2918,7 @@
           <a:p>
             <a:fld id="{619DA116-9E36-A740-B8E8-0332E2C9182A}" type="datetimeFigureOut">
               <a:rPr lang="en-US" smtClean="0"/>
-              <a:t>4/4/20</a:t>
+              <a:t>4/14/20</a:t>
             </a:fld>
             <a:endParaRPr lang="en-US"/>
           </a:p>
@@ -3637,8 +3642,8 @@
           </a:p>
         </p:txBody>
       </p:sp>
-      <mc:AlternateContent xmlns:mc="http://schemas.openxmlformats.org/markup-compatibility/2006">
-        <mc:Choice xmlns:a14="http://schemas.microsoft.com/office/drawing/2010/main" Requires="a14">
+      <mc:AlternateContent xmlns:mc="http://schemas.openxmlformats.org/markup-compatibility/2006" xmlns:a14="http://schemas.microsoft.com/office/drawing/2010/main">
+        <mc:Choice Requires="a14">
           <p:sp>
             <p:nvSpPr>
               <p:cNvPr id="3" name="Content Placeholder 2">
@@ -3814,7 +3819,7 @@
             </p:txBody>
           </p:sp>
         </mc:Choice>
-        <mc:Fallback>
+        <mc:Fallback xmlns="">
           <p:sp>
             <p:nvSpPr>
               <p:cNvPr id="3" name="Content Placeholder 2">
@@ -3912,8 +3917,8 @@
           </a:p>
         </p:txBody>
       </p:sp>
-      <mc:AlternateContent xmlns:mc="http://schemas.openxmlformats.org/markup-compatibility/2006">
-        <mc:Choice xmlns:a14="http://schemas.microsoft.com/office/drawing/2010/main" Requires="a14">
+      <mc:AlternateContent xmlns:mc="http://schemas.openxmlformats.org/markup-compatibility/2006" xmlns:a14="http://schemas.microsoft.com/office/drawing/2010/main">
+        <mc:Choice Requires="a14">
           <p:sp>
             <p:nvSpPr>
               <p:cNvPr id="3" name="Content Placeholder 2">
@@ -4067,7 +4072,7 @@
             </p:txBody>
           </p:sp>
         </mc:Choice>
-        <mc:Fallback>
+        <mc:Fallback xmlns="">
           <p:sp>
             <p:nvSpPr>
               <p:cNvPr id="3" name="Content Placeholder 2">
@@ -4259,7 +4264,7 @@
                     <m:sSub>
                       <m:sSubPr>
                         <m:ctrlPr>
-                          <a:rPr lang="en-US" b="0" i="0" smtClean="0">
+                          <a:rPr lang="en-US" b="0" i="1" smtClean="0">
                             <a:latin typeface="Cambria Math" panose="02040503050406030204" pitchFamily="18" charset="0"/>
                           </a:rPr>
                         </m:ctrlPr>
@@ -4302,7 +4307,7 @@
                     <m:d>
                       <m:dPr>
                         <m:ctrlPr>
-                          <a:rPr lang="en-US" b="0" i="0" smtClean="0">
+                          <a:rPr lang="en-US" b="0" i="1" smtClean="0">
                             <a:latin typeface="Cambria Math" panose="02040503050406030204" pitchFamily="18" charset="0"/>
                           </a:rPr>
                         </m:ctrlPr>
@@ -4330,7 +4335,7 @@
                         <m:begChr m:val="|"/>
                         <m:endChr m:val="|"/>
                         <m:ctrlPr>
-                          <a:rPr lang="en-US" b="0" i="0" smtClean="0">
+                          <a:rPr lang="en-US" b="0" i="1" smtClean="0">
                             <a:latin typeface="Cambria Math" panose="02040503050406030204" pitchFamily="18" charset="0"/>
                           </a:rPr>
                         </m:ctrlPr>
@@ -4341,7 +4346,7 @@
                             <m:begChr m:val="{"/>
                             <m:endChr m:val="}"/>
                             <m:ctrlPr>
-                              <a:rPr lang="en-US" b="0" i="0" smtClean="0">
+                              <a:rPr lang="en-US" b="0" i="1" smtClean="0">
                                 <a:latin typeface="Cambria Math" panose="02040503050406030204" pitchFamily="18" charset="0"/>
                               </a:rPr>
                             </m:ctrlPr>
@@ -4681,7 +4686,7 @@
                   <a:rPr lang="en-US" dirty="0">
                     <a:latin typeface="Cambria Math" panose="02040503050406030204" pitchFamily="18" charset="0"/>
                   </a:rPr>
-                  <a:t>Bottom up order: (4,5), (5,6), (4,7),(4,8),(1,2),(1,3), (1,8), (4,9)</a:t>
+                  <a:t>Bottom up order: (4,5), (5,6), (4,7),(4,8),(1,2),(2,3), (1,8), (4,9)</a:t>
                 </a:r>
               </a:p>
               <a:p>
@@ -5624,8 +5629,8 @@
           </a:p>
         </p:txBody>
       </p:sp>
-      <mc:AlternateContent xmlns:mc="http://schemas.openxmlformats.org/markup-compatibility/2006">
-        <mc:Choice xmlns:a14="http://schemas.microsoft.com/office/drawing/2010/main" Requires="a14">
+      <mc:AlternateContent xmlns:mc="http://schemas.openxmlformats.org/markup-compatibility/2006" xmlns:a14="http://schemas.microsoft.com/office/drawing/2010/main">
+        <mc:Choice Requires="a14">
           <p:sp>
             <p:nvSpPr>
               <p:cNvPr id="3" name="TextBox 2">
@@ -5841,7 +5846,7 @@
             </p:txBody>
           </p:sp>
         </mc:Choice>
-        <mc:Fallback>
+        <mc:Fallback xmlns="">
           <p:sp>
             <p:nvSpPr>
               <p:cNvPr id="3" name="TextBox 2">
@@ -6358,8 +6363,8 @@
           </a:p>
         </p:txBody>
       </p:sp>
-      <mc:AlternateContent xmlns:mc="http://schemas.openxmlformats.org/markup-compatibility/2006">
-        <mc:Choice xmlns:a14="http://schemas.microsoft.com/office/drawing/2010/main" Requires="a14">
+      <mc:AlternateContent xmlns:mc="http://schemas.openxmlformats.org/markup-compatibility/2006" xmlns:a14="http://schemas.microsoft.com/office/drawing/2010/main">
+        <mc:Choice Requires="a14">
           <p:sp>
             <p:nvSpPr>
               <p:cNvPr id="14" name="TextBox 13">
@@ -6539,7 +6544,7 @@
             </p:txBody>
           </p:sp>
         </mc:Choice>
-        <mc:Fallback>
+        <mc:Fallback xmlns="">
           <p:sp>
             <p:nvSpPr>
               <p:cNvPr id="14" name="TextBox 13">

</xml_diff>

<commit_message>
fixed a bug in pq frontiers, maybe found problem in merged char in tree reconstruction
</commit_message>
<xml_diff>
--- a/pqtrees/pqtree.pptx
+++ b/pqtrees/pqtree.pptx
@@ -3584,6 +3584,38 @@
           </a:prstGeom>
         </p:spPr>
       </p:pic>
+      <p:sp>
+        <p:nvSpPr>
+          <p:cNvPr id="3" name="TextBox 2">
+            <a:extLst>
+              <a:ext uri="{FF2B5EF4-FFF2-40B4-BE49-F238E27FC236}">
+                <a16:creationId xmlns:a16="http://schemas.microsoft.com/office/drawing/2014/main" id="{64E3C2F3-9062-7142-843F-686D25DEE3BF}"/>
+              </a:ext>
+            </a:extLst>
+          </p:cNvPr>
+          <p:cNvSpPr txBox="1"/>
+          <p:nvPr/>
+        </p:nvSpPr>
+        <p:spPr>
+          <a:xfrm>
+            <a:off x="6889898" y="-882502"/>
+            <a:ext cx="184731" cy="369332"/>
+          </a:xfrm>
+          <a:prstGeom prst="rect">
+            <a:avLst/>
+          </a:prstGeom>
+          <a:noFill/>
+        </p:spPr>
+        <p:txBody>
+          <a:bodyPr wrap="none" rtlCol="0">
+            <a:spAutoFit/>
+          </a:bodyPr>
+          <a:lstStyle/>
+          <a:p>
+            <a:endParaRPr lang="en-US"/>
+          </a:p>
+        </p:txBody>
+      </p:sp>
     </p:spTree>
     <p:extLst>
       <p:ext uri="{BB962C8B-B14F-4D97-AF65-F5344CB8AC3E}">

</xml_diff>